<commit_message>
Primeira versão Manual da Arquitetura
</commit_message>
<xml_diff>
--- a/Documentos/Arquitetura.pptx
+++ b/Documentos/Arquitetura.pptx
@@ -104,6 +104,11 @@
       </a:defRPr>
     </a:lvl9pPr>
   </p:defaultTextStyle>
+  <p:extLst>
+    <p:ext uri="{EFAFB233-063F-42B5-8137-9DF3F51BA10A}">
+      <p15:sldGuideLst xmlns:p15="http://schemas.microsoft.com/office/powerpoint/2012/main"/>
+    </p:ext>
+  </p:extLst>
 </p:presentation>
 </file>
 
@@ -256,7 +261,7 @@
           <a:p>
             <a:fld id="{879BF62B-022A-4E09-A950-5F168E7DB623}" type="datetimeFigureOut">
               <a:rPr lang="pt-BR" smtClean="0"/>
-              <a:t>18/03/2019</a:t>
+              <a:t>19/03/2019</a:t>
             </a:fld>
             <a:endParaRPr lang="pt-BR"/>
           </a:p>
@@ -456,7 +461,7 @@
           <a:p>
             <a:fld id="{879BF62B-022A-4E09-A950-5F168E7DB623}" type="datetimeFigureOut">
               <a:rPr lang="pt-BR" smtClean="0"/>
-              <a:t>18/03/2019</a:t>
+              <a:t>19/03/2019</a:t>
             </a:fld>
             <a:endParaRPr lang="pt-BR"/>
           </a:p>
@@ -666,7 +671,7 @@
           <a:p>
             <a:fld id="{879BF62B-022A-4E09-A950-5F168E7DB623}" type="datetimeFigureOut">
               <a:rPr lang="pt-BR" smtClean="0"/>
-              <a:t>18/03/2019</a:t>
+              <a:t>19/03/2019</a:t>
             </a:fld>
             <a:endParaRPr lang="pt-BR"/>
           </a:p>
@@ -866,7 +871,7 @@
           <a:p>
             <a:fld id="{879BF62B-022A-4E09-A950-5F168E7DB623}" type="datetimeFigureOut">
               <a:rPr lang="pt-BR" smtClean="0"/>
-              <a:t>18/03/2019</a:t>
+              <a:t>19/03/2019</a:t>
             </a:fld>
             <a:endParaRPr lang="pt-BR"/>
           </a:p>
@@ -1142,7 +1147,7 @@
           <a:p>
             <a:fld id="{879BF62B-022A-4E09-A950-5F168E7DB623}" type="datetimeFigureOut">
               <a:rPr lang="pt-BR" smtClean="0"/>
-              <a:t>18/03/2019</a:t>
+              <a:t>19/03/2019</a:t>
             </a:fld>
             <a:endParaRPr lang="pt-BR"/>
           </a:p>
@@ -1410,7 +1415,7 @@
           <a:p>
             <a:fld id="{879BF62B-022A-4E09-A950-5F168E7DB623}" type="datetimeFigureOut">
               <a:rPr lang="pt-BR" smtClean="0"/>
-              <a:t>18/03/2019</a:t>
+              <a:t>19/03/2019</a:t>
             </a:fld>
             <a:endParaRPr lang="pt-BR"/>
           </a:p>
@@ -1825,7 +1830,7 @@
           <a:p>
             <a:fld id="{879BF62B-022A-4E09-A950-5F168E7DB623}" type="datetimeFigureOut">
               <a:rPr lang="pt-BR" smtClean="0"/>
-              <a:t>18/03/2019</a:t>
+              <a:t>19/03/2019</a:t>
             </a:fld>
             <a:endParaRPr lang="pt-BR"/>
           </a:p>
@@ -1967,7 +1972,7 @@
           <a:p>
             <a:fld id="{879BF62B-022A-4E09-A950-5F168E7DB623}" type="datetimeFigureOut">
               <a:rPr lang="pt-BR" smtClean="0"/>
-              <a:t>18/03/2019</a:t>
+              <a:t>19/03/2019</a:t>
             </a:fld>
             <a:endParaRPr lang="pt-BR"/>
           </a:p>
@@ -2080,7 +2085,7 @@
           <a:p>
             <a:fld id="{879BF62B-022A-4E09-A950-5F168E7DB623}" type="datetimeFigureOut">
               <a:rPr lang="pt-BR" smtClean="0"/>
-              <a:t>18/03/2019</a:t>
+              <a:t>19/03/2019</a:t>
             </a:fld>
             <a:endParaRPr lang="pt-BR"/>
           </a:p>
@@ -2393,7 +2398,7 @@
           <a:p>
             <a:fld id="{879BF62B-022A-4E09-A950-5F168E7DB623}" type="datetimeFigureOut">
               <a:rPr lang="pt-BR" smtClean="0"/>
-              <a:t>18/03/2019</a:t>
+              <a:t>19/03/2019</a:t>
             </a:fld>
             <a:endParaRPr lang="pt-BR"/>
           </a:p>
@@ -2682,7 +2687,7 @@
           <a:p>
             <a:fld id="{879BF62B-022A-4E09-A950-5F168E7DB623}" type="datetimeFigureOut">
               <a:rPr lang="pt-BR" smtClean="0"/>
-              <a:t>18/03/2019</a:t>
+              <a:t>19/03/2019</a:t>
             </a:fld>
             <a:endParaRPr lang="pt-BR"/>
           </a:p>
@@ -2925,7 +2930,7 @@
           <a:p>
             <a:fld id="{879BF62B-022A-4E09-A950-5F168E7DB623}" type="datetimeFigureOut">
               <a:rPr lang="pt-BR" smtClean="0"/>
-              <a:t>18/03/2019</a:t>
+              <a:t>19/03/2019</a:t>
             </a:fld>
             <a:endParaRPr lang="pt-BR"/>
           </a:p>
@@ -4150,8 +4155,8 @@
         </p:nvSpPr>
         <p:spPr>
           <a:xfrm>
-            <a:off x="4673599" y="3985840"/>
-            <a:ext cx="6264207" cy="1094160"/>
+            <a:off x="4673599" y="3985839"/>
+            <a:ext cx="6264207" cy="1149553"/>
           </a:xfrm>
           <a:prstGeom prst="roundRect">
             <a:avLst/>
@@ -4387,51 +4392,26 @@
         </p:nvSpPr>
         <p:spPr>
           <a:xfrm>
-            <a:off x="8424486" y="4142389"/>
-            <a:ext cx="2184399" cy="342900"/>
+            <a:off x="8424485" y="4010963"/>
+            <a:ext cx="2184399" cy="586158"/>
           </a:xfrm>
           <a:prstGeom prst="roundRect">
             <a:avLst/>
           </a:prstGeom>
-          <a:gradFill flip="none" rotWithShape="1">
-            <a:gsLst>
-              <a:gs pos="0">
-                <a:schemeClr val="accent4">
-                  <a:lumMod val="67000"/>
-                </a:schemeClr>
-              </a:gs>
-              <a:gs pos="48000">
-                <a:schemeClr val="accent4">
-                  <a:lumMod val="97000"/>
-                  <a:lumOff val="3000"/>
-                </a:schemeClr>
-              </a:gs>
-              <a:gs pos="100000">
-                <a:schemeClr val="accent4">
-                  <a:lumMod val="60000"/>
-                  <a:lumOff val="40000"/>
-                </a:schemeClr>
-              </a:gs>
-            </a:gsLst>
-            <a:lin ang="16200000" scaled="1"/>
-            <a:tileRect/>
-          </a:gradFill>
-          <a:ln>
-            <a:noFill/>
-          </a:ln>
+          <a:ln/>
         </p:spPr>
         <p:style>
-          <a:lnRef idx="0">
-            <a:scrgbClr r="0" g="0" b="0"/>
+          <a:lnRef idx="1">
+            <a:schemeClr val="accent6"/>
           </a:lnRef>
-          <a:fillRef idx="0">
-            <a:scrgbClr r="0" g="0" b="0"/>
+          <a:fillRef idx="2">
+            <a:schemeClr val="accent6"/>
           </a:fillRef>
-          <a:effectRef idx="0">
-            <a:scrgbClr r="0" g="0" b="0"/>
+          <a:effectRef idx="1">
+            <a:schemeClr val="accent6"/>
           </a:effectRef>
           <a:fontRef idx="minor">
-            <a:schemeClr val="lt1"/>
+            <a:schemeClr val="dk1"/>
           </a:fontRef>
         </p:style>
         <p:txBody>
@@ -4441,6 +4421,13 @@
             <a:pPr algn="ctr"/>
             <a:r>
               <a:rPr lang="pt-BR" sz="1200" dirty="0"/>
+              <a:t>Contratos de Serviços e...</a:t>
+            </a:r>
+          </a:p>
+          <a:p>
+            <a:pPr algn="ctr"/>
+            <a:r>
+              <a:rPr lang="pt-BR" sz="1200" dirty="0"/>
               <a:t>Serviços de Domínio</a:t>
             </a:r>
           </a:p>
@@ -4460,8 +4447,8 @@
         </p:nvSpPr>
         <p:spPr>
           <a:xfrm>
-            <a:off x="8424486" y="4611194"/>
-            <a:ext cx="2184399" cy="342900"/>
+            <a:off x="8424486" y="4726337"/>
+            <a:ext cx="2184398" cy="342900"/>
           </a:xfrm>
           <a:prstGeom prst="roundRect">
             <a:avLst/>
@@ -5008,6 +4995,98 @@
           <a:p>
             <a:pPr algn="ctr"/>
             <a:endParaRPr lang="pt-BR"/>
+          </a:p>
+        </p:txBody>
+      </p:sp>
+      <p:sp>
+        <p:nvSpPr>
+          <p:cNvPr id="2" name="Arrow: Down 1">
+            <a:extLst>
+              <a:ext uri="{FF2B5EF4-FFF2-40B4-BE49-F238E27FC236}">
+                <a16:creationId xmlns:a16="http://schemas.microsoft.com/office/drawing/2014/main" id="{BDBA7D4D-439F-4124-8E1F-0A6DDAACF89A}"/>
+              </a:ext>
+            </a:extLst>
+          </p:cNvPr>
+          <p:cNvSpPr/>
+          <p:nvPr/>
+        </p:nvSpPr>
+        <p:spPr>
+          <a:xfrm>
+            <a:off x="9032905" y="4597121"/>
+            <a:ext cx="67855" cy="129216"/>
+          </a:xfrm>
+          <a:prstGeom prst="downArrow">
+            <a:avLst/>
+          </a:prstGeom>
+        </p:spPr>
+        <p:style>
+          <a:lnRef idx="2">
+            <a:schemeClr val="accent1">
+              <a:shade val="50000"/>
+            </a:schemeClr>
+          </a:lnRef>
+          <a:fillRef idx="1">
+            <a:schemeClr val="accent1"/>
+          </a:fillRef>
+          <a:effectRef idx="0">
+            <a:schemeClr val="accent1"/>
+          </a:effectRef>
+          <a:fontRef idx="minor">
+            <a:schemeClr val="lt1"/>
+          </a:fontRef>
+        </p:style>
+        <p:txBody>
+          <a:bodyPr rtlCol="0" anchor="ctr"/>
+          <a:lstStyle/>
+          <a:p>
+            <a:pPr algn="ctr"/>
+            <a:endParaRPr lang="en-US"/>
+          </a:p>
+        </p:txBody>
+      </p:sp>
+      <p:sp>
+        <p:nvSpPr>
+          <p:cNvPr id="42" name="Arrow: Down 41">
+            <a:extLst>
+              <a:ext uri="{FF2B5EF4-FFF2-40B4-BE49-F238E27FC236}">
+                <a16:creationId xmlns:a16="http://schemas.microsoft.com/office/drawing/2014/main" id="{DD3FDA29-DE31-4CFF-A634-F7D7E7B6B49D}"/>
+              </a:ext>
+            </a:extLst>
+          </p:cNvPr>
+          <p:cNvSpPr/>
+          <p:nvPr/>
+        </p:nvSpPr>
+        <p:spPr>
+          <a:xfrm>
+            <a:off x="10039380" y="4600430"/>
+            <a:ext cx="67855" cy="129216"/>
+          </a:xfrm>
+          <a:prstGeom prst="downArrow">
+            <a:avLst/>
+          </a:prstGeom>
+        </p:spPr>
+        <p:style>
+          <a:lnRef idx="2">
+            <a:schemeClr val="accent1">
+              <a:shade val="50000"/>
+            </a:schemeClr>
+          </a:lnRef>
+          <a:fillRef idx="1">
+            <a:schemeClr val="accent1"/>
+          </a:fillRef>
+          <a:effectRef idx="0">
+            <a:schemeClr val="accent1"/>
+          </a:effectRef>
+          <a:fontRef idx="minor">
+            <a:schemeClr val="lt1"/>
+          </a:fontRef>
+        </p:style>
+        <p:txBody>
+          <a:bodyPr rtlCol="0" anchor="ctr"/>
+          <a:lstStyle/>
+          <a:p>
+            <a:pPr algn="ctr"/>
+            <a:endParaRPr lang="en-US"/>
           </a:p>
         </p:txBody>
       </p:sp>

</xml_diff>